<commit_message>
Added code in 01 to output lasar data compilation for use as import in the future to simplify the code. Added code in 02 to run data summaries on complete dataset and not just on data without new methods. Added saltwater criteria to data flow diagram for 03. Added comments to 03 to clarify the basin summary outputs.In criteria, updated table 20 references to say table 30.
</commit_message>
<xml_diff>
--- a/03_All_Parameter_Analysis_DataFlowDiagram.pptx
+++ b/03_All_Parameter_Analysis_DataFlowDiagram.pptx
@@ -192,7 +192,8 @@
           <a:p>
             <a:fld id="{FF49D625-2878-4E69-ADC8-E5C4C82ED8DA}" type="datetimeFigureOut">
               <a:rPr lang="en-US" smtClean="0"/>
-              <a:t>2/10/2014</a:t>
+              <a:pPr/>
+              <a:t>2/13/2014</a:t>
             </a:fld>
             <a:endParaRPr lang="en-US"/>
           </a:p>
@@ -353,6 +354,7 @@
           <a:p>
             <a:fld id="{5A321E04-9E7E-4E02-A31A-F4D61614B0DE}" type="slidenum">
               <a:rPr lang="en-US" smtClean="0"/>
+              <a:pPr/>
               <a:t>‹#›</a:t>
             </a:fld>
             <a:endParaRPr lang="en-US"/>
@@ -524,6 +526,7 @@
           <a:p>
             <a:fld id="{5A321E04-9E7E-4E02-A31A-F4D61614B0DE}" type="slidenum">
               <a:rPr lang="en-US" smtClean="0"/>
+              <a:pPr/>
               <a:t>1</a:t>
             </a:fld>
             <a:endParaRPr lang="en-US"/>
@@ -719,7 +722,8 @@
           <a:p>
             <a:fld id="{E5A8B3FC-C612-448D-904A-F6AD773B54F6}" type="datetimeFigureOut">
               <a:rPr lang="en-US" smtClean="0"/>
-              <a:t>2/10/2014</a:t>
+              <a:pPr/>
+              <a:t>2/13/2014</a:t>
             </a:fld>
             <a:endParaRPr lang="en-US"/>
           </a:p>
@@ -761,6 +765,7 @@
           <a:p>
             <a:fld id="{668CFFE1-9A75-4281-B206-DA84F7FC79C8}" type="slidenum">
               <a:rPr lang="en-US" smtClean="0"/>
+              <a:pPr/>
               <a:t>‹#›</a:t>
             </a:fld>
             <a:endParaRPr lang="en-US"/>
@@ -884,7 +889,8 @@
           <a:p>
             <a:fld id="{E5A8B3FC-C612-448D-904A-F6AD773B54F6}" type="datetimeFigureOut">
               <a:rPr lang="en-US" smtClean="0"/>
-              <a:t>2/10/2014</a:t>
+              <a:pPr/>
+              <a:t>2/13/2014</a:t>
             </a:fld>
             <a:endParaRPr lang="en-US"/>
           </a:p>
@@ -926,6 +932,7 @@
           <a:p>
             <a:fld id="{668CFFE1-9A75-4281-B206-DA84F7FC79C8}" type="slidenum">
               <a:rPr lang="en-US" smtClean="0"/>
+              <a:pPr/>
               <a:t>‹#›</a:t>
             </a:fld>
             <a:endParaRPr lang="en-US"/>
@@ -1059,7 +1066,8 @@
           <a:p>
             <a:fld id="{E5A8B3FC-C612-448D-904A-F6AD773B54F6}" type="datetimeFigureOut">
               <a:rPr lang="en-US" smtClean="0"/>
-              <a:t>2/10/2014</a:t>
+              <a:pPr/>
+              <a:t>2/13/2014</a:t>
             </a:fld>
             <a:endParaRPr lang="en-US"/>
           </a:p>
@@ -1101,6 +1109,7 @@
           <a:p>
             <a:fld id="{668CFFE1-9A75-4281-B206-DA84F7FC79C8}" type="slidenum">
               <a:rPr lang="en-US" smtClean="0"/>
+              <a:pPr/>
               <a:t>‹#›</a:t>
             </a:fld>
             <a:endParaRPr lang="en-US"/>
@@ -1224,7 +1233,8 @@
           <a:p>
             <a:fld id="{E5A8B3FC-C612-448D-904A-F6AD773B54F6}" type="datetimeFigureOut">
               <a:rPr lang="en-US" smtClean="0"/>
-              <a:t>2/10/2014</a:t>
+              <a:pPr/>
+              <a:t>2/13/2014</a:t>
             </a:fld>
             <a:endParaRPr lang="en-US"/>
           </a:p>
@@ -1266,6 +1276,7 @@
           <a:p>
             <a:fld id="{668CFFE1-9A75-4281-B206-DA84F7FC79C8}" type="slidenum">
               <a:rPr lang="en-US" smtClean="0"/>
+              <a:pPr/>
               <a:t>‹#›</a:t>
             </a:fld>
             <a:endParaRPr lang="en-US"/>
@@ -1465,7 +1476,8 @@
           <a:p>
             <a:fld id="{E5A8B3FC-C612-448D-904A-F6AD773B54F6}" type="datetimeFigureOut">
               <a:rPr lang="en-US" smtClean="0"/>
-              <a:t>2/10/2014</a:t>
+              <a:pPr/>
+              <a:t>2/13/2014</a:t>
             </a:fld>
             <a:endParaRPr lang="en-US"/>
           </a:p>
@@ -1507,6 +1519,7 @@
           <a:p>
             <a:fld id="{668CFFE1-9A75-4281-B206-DA84F7FC79C8}" type="slidenum">
               <a:rPr lang="en-US" smtClean="0"/>
+              <a:pPr/>
               <a:t>‹#›</a:t>
             </a:fld>
             <a:endParaRPr lang="en-US"/>
@@ -1748,7 +1761,8 @@
           <a:p>
             <a:fld id="{E5A8B3FC-C612-448D-904A-F6AD773B54F6}" type="datetimeFigureOut">
               <a:rPr lang="en-US" smtClean="0"/>
-              <a:t>2/10/2014</a:t>
+              <a:pPr/>
+              <a:t>2/13/2014</a:t>
             </a:fld>
             <a:endParaRPr lang="en-US"/>
           </a:p>
@@ -1790,6 +1804,7 @@
           <a:p>
             <a:fld id="{668CFFE1-9A75-4281-B206-DA84F7FC79C8}" type="slidenum">
               <a:rPr lang="en-US" smtClean="0"/>
+              <a:pPr/>
               <a:t>‹#›</a:t>
             </a:fld>
             <a:endParaRPr lang="en-US"/>
@@ -2165,7 +2180,8 @@
           <a:p>
             <a:fld id="{E5A8B3FC-C612-448D-904A-F6AD773B54F6}" type="datetimeFigureOut">
               <a:rPr lang="en-US" smtClean="0"/>
-              <a:t>2/10/2014</a:t>
+              <a:pPr/>
+              <a:t>2/13/2014</a:t>
             </a:fld>
             <a:endParaRPr lang="en-US"/>
           </a:p>
@@ -2207,6 +2223,7 @@
           <a:p>
             <a:fld id="{668CFFE1-9A75-4281-B206-DA84F7FC79C8}" type="slidenum">
               <a:rPr lang="en-US" smtClean="0"/>
+              <a:pPr/>
               <a:t>‹#›</a:t>
             </a:fld>
             <a:endParaRPr lang="en-US"/>
@@ -2278,7 +2295,8 @@
           <a:p>
             <a:fld id="{E5A8B3FC-C612-448D-904A-F6AD773B54F6}" type="datetimeFigureOut">
               <a:rPr lang="en-US" smtClean="0"/>
-              <a:t>2/10/2014</a:t>
+              <a:pPr/>
+              <a:t>2/13/2014</a:t>
             </a:fld>
             <a:endParaRPr lang="en-US"/>
           </a:p>
@@ -2320,6 +2338,7 @@
           <a:p>
             <a:fld id="{668CFFE1-9A75-4281-B206-DA84F7FC79C8}" type="slidenum">
               <a:rPr lang="en-US" smtClean="0"/>
+              <a:pPr/>
               <a:t>‹#›</a:t>
             </a:fld>
             <a:endParaRPr lang="en-US"/>
@@ -2368,7 +2387,8 @@
           <a:p>
             <a:fld id="{E5A8B3FC-C612-448D-904A-F6AD773B54F6}" type="datetimeFigureOut">
               <a:rPr lang="en-US" smtClean="0"/>
-              <a:t>2/10/2014</a:t>
+              <a:pPr/>
+              <a:t>2/13/2014</a:t>
             </a:fld>
             <a:endParaRPr lang="en-US"/>
           </a:p>
@@ -2410,6 +2430,7 @@
           <a:p>
             <a:fld id="{668CFFE1-9A75-4281-B206-DA84F7FC79C8}" type="slidenum">
               <a:rPr lang="en-US" smtClean="0"/>
+              <a:pPr/>
               <a:t>‹#›</a:t>
             </a:fld>
             <a:endParaRPr lang="en-US"/>
@@ -2640,7 +2661,8 @@
           <a:p>
             <a:fld id="{E5A8B3FC-C612-448D-904A-F6AD773B54F6}" type="datetimeFigureOut">
               <a:rPr lang="en-US" smtClean="0"/>
-              <a:t>2/10/2014</a:t>
+              <a:pPr/>
+              <a:t>2/13/2014</a:t>
             </a:fld>
             <a:endParaRPr lang="en-US"/>
           </a:p>
@@ -2682,6 +2704,7 @@
           <a:p>
             <a:fld id="{668CFFE1-9A75-4281-B206-DA84F7FC79C8}" type="slidenum">
               <a:rPr lang="en-US" smtClean="0"/>
+              <a:pPr/>
               <a:t>‹#›</a:t>
             </a:fld>
             <a:endParaRPr lang="en-US"/>
@@ -2888,7 +2911,8 @@
           <a:p>
             <a:fld id="{E5A8B3FC-C612-448D-904A-F6AD773B54F6}" type="datetimeFigureOut">
               <a:rPr lang="en-US" smtClean="0"/>
-              <a:t>2/10/2014</a:t>
+              <a:pPr/>
+              <a:t>2/13/2014</a:t>
             </a:fld>
             <a:endParaRPr lang="en-US"/>
           </a:p>
@@ -2930,6 +2954,7 @@
           <a:p>
             <a:fld id="{668CFFE1-9A75-4281-B206-DA84F7FC79C8}" type="slidenum">
               <a:rPr lang="en-US" smtClean="0"/>
+              <a:pPr/>
               <a:t>‹#›</a:t>
             </a:fld>
             <a:endParaRPr lang="en-US"/>
@@ -3096,7 +3121,8 @@
           <a:p>
             <a:fld id="{E5A8B3FC-C612-448D-904A-F6AD773B54F6}" type="datetimeFigureOut">
               <a:rPr lang="en-US" smtClean="0"/>
-              <a:t>2/10/2014</a:t>
+              <a:pPr/>
+              <a:t>2/13/2014</a:t>
             </a:fld>
             <a:endParaRPr lang="en-US"/>
           </a:p>
@@ -3174,6 +3200,7 @@
           <a:p>
             <a:fld id="{668CFFE1-9A75-4281-B206-DA84F7FC79C8}" type="slidenum">
               <a:rPr lang="en-US" smtClean="0"/>
+              <a:pPr/>
               <a:t>‹#›</a:t>
             </a:fld>
             <a:endParaRPr lang="en-US"/>
@@ -4884,6 +4911,206 @@
           </a:p>
         </p:txBody>
       </p:sp>
+      <p:sp>
+        <p:nvSpPr>
+          <p:cNvPr id="35" name="Rectangle 34"/>
+          <p:cNvSpPr/>
+          <p:nvPr/>
+        </p:nvSpPr>
+        <p:spPr>
+          <a:xfrm>
+            <a:off x="6858000" y="1828800"/>
+            <a:ext cx="1600200" cy="990600"/>
+          </a:xfrm>
+          <a:prstGeom prst="rect">
+            <a:avLst/>
+          </a:prstGeom>
+          <a:solidFill>
+            <a:schemeClr val="bg1"/>
+          </a:solidFill>
+          <a:ln>
+            <a:solidFill>
+              <a:srgbClr val="92D050"/>
+            </a:solidFill>
+            <a:prstDash val="sysDash"/>
+          </a:ln>
+        </p:spPr>
+        <p:style>
+          <a:lnRef idx="2">
+            <a:schemeClr val="accent1">
+              <a:shade val="50000"/>
+            </a:schemeClr>
+          </a:lnRef>
+          <a:fillRef idx="1">
+            <a:schemeClr val="accent1"/>
+          </a:fillRef>
+          <a:effectRef idx="0">
+            <a:schemeClr val="accent1"/>
+          </a:effectRef>
+          <a:fontRef idx="minor">
+            <a:schemeClr val="lt1"/>
+          </a:fontRef>
+        </p:style>
+        <p:txBody>
+          <a:bodyPr rtlCol="0" anchor="ctr"/>
+          <a:lstStyle/>
+          <a:p>
+            <a:pPr algn="ctr"/>
+            <a:r>
+              <a:rPr lang="en-US" dirty="0" smtClean="0">
+                <a:solidFill>
+                  <a:schemeClr val="tx1"/>
+                </a:solidFill>
+              </a:rPr>
+              <a:t>Saltwater calculations</a:t>
+            </a:r>
+            <a:endParaRPr lang="en-US" dirty="0">
+              <a:solidFill>
+                <a:schemeClr val="tx1"/>
+              </a:solidFill>
+            </a:endParaRPr>
+          </a:p>
+        </p:txBody>
+      </p:sp>
+      <p:sp>
+        <p:nvSpPr>
+          <p:cNvPr id="36" name="Oval 35"/>
+          <p:cNvSpPr/>
+          <p:nvPr/>
+        </p:nvSpPr>
+        <p:spPr>
+          <a:xfrm>
+            <a:off x="7239000" y="838200"/>
+            <a:ext cx="1676400" cy="762000"/>
+          </a:xfrm>
+          <a:prstGeom prst="ellipse">
+            <a:avLst/>
+          </a:prstGeom>
+          <a:solidFill>
+            <a:schemeClr val="bg1"/>
+          </a:solidFill>
+          <a:ln>
+            <a:solidFill>
+              <a:srgbClr val="92D050"/>
+            </a:solidFill>
+            <a:prstDash val="sysDash"/>
+          </a:ln>
+        </p:spPr>
+        <p:style>
+          <a:lnRef idx="2">
+            <a:schemeClr val="accent1">
+              <a:shade val="50000"/>
+            </a:schemeClr>
+          </a:lnRef>
+          <a:fillRef idx="1">
+            <a:schemeClr val="accent1"/>
+          </a:fillRef>
+          <a:effectRef idx="0">
+            <a:schemeClr val="accent1"/>
+          </a:effectRef>
+          <a:fontRef idx="minor">
+            <a:schemeClr val="lt1"/>
+          </a:fontRef>
+        </p:style>
+        <p:txBody>
+          <a:bodyPr rtlCol="0" anchor="ctr"/>
+          <a:lstStyle/>
+          <a:p>
+            <a:pPr algn="ctr"/>
+            <a:r>
+              <a:rPr lang="en-US" dirty="0" smtClean="0">
+                <a:solidFill>
+                  <a:schemeClr val="tx1"/>
+                </a:solidFill>
+              </a:rPr>
+              <a:t>Saltwater criteria</a:t>
+            </a:r>
+            <a:endParaRPr lang="en-US" dirty="0">
+              <a:solidFill>
+                <a:schemeClr val="tx1"/>
+              </a:solidFill>
+            </a:endParaRPr>
+          </a:p>
+        </p:txBody>
+      </p:sp>
+      <p:cxnSp>
+        <p:nvCxnSpPr>
+          <p:cNvPr id="38" name="Straight Arrow Connector 37"/>
+          <p:cNvCxnSpPr>
+            <a:stCxn id="36" idx="4"/>
+            <a:endCxn id="35" idx="0"/>
+          </p:cNvCxnSpPr>
+          <p:nvPr/>
+        </p:nvCxnSpPr>
+        <p:spPr>
+          <a:xfrm flipH="1">
+            <a:off x="7658100" y="1600200"/>
+            <a:ext cx="419100" cy="228600"/>
+          </a:xfrm>
+          <a:prstGeom prst="straightConnector1">
+            <a:avLst/>
+          </a:prstGeom>
+          <a:ln>
+            <a:solidFill>
+              <a:srgbClr val="92D050"/>
+            </a:solidFill>
+            <a:tailEnd type="arrow"/>
+          </a:ln>
+        </p:spPr>
+        <p:style>
+          <a:lnRef idx="1">
+            <a:schemeClr val="accent1"/>
+          </a:lnRef>
+          <a:fillRef idx="0">
+            <a:schemeClr val="accent1"/>
+          </a:fillRef>
+          <a:effectRef idx="0">
+            <a:schemeClr val="accent1"/>
+          </a:effectRef>
+          <a:fontRef idx="minor">
+            <a:schemeClr val="tx1"/>
+          </a:fontRef>
+        </p:style>
+      </p:cxnSp>
+      <p:cxnSp>
+        <p:nvCxnSpPr>
+          <p:cNvPr id="41" name="Straight Arrow Connector 40"/>
+          <p:cNvCxnSpPr>
+            <a:stCxn id="35" idx="1"/>
+            <a:endCxn id="43" idx="7"/>
+          </p:cNvCxnSpPr>
+          <p:nvPr/>
+        </p:nvCxnSpPr>
+        <p:spPr>
+          <a:xfrm flipH="1">
+            <a:off x="4575501" y="2324100"/>
+            <a:ext cx="2282499" cy="772366"/>
+          </a:xfrm>
+          <a:prstGeom prst="straightConnector1">
+            <a:avLst/>
+          </a:prstGeom>
+          <a:ln>
+            <a:solidFill>
+              <a:srgbClr val="92D050"/>
+            </a:solidFill>
+            <a:tailEnd type="arrow"/>
+          </a:ln>
+        </p:spPr>
+        <p:style>
+          <a:lnRef idx="1">
+            <a:schemeClr val="accent1"/>
+          </a:lnRef>
+          <a:fillRef idx="0">
+            <a:schemeClr val="accent1"/>
+          </a:fillRef>
+          <a:effectRef idx="0">
+            <a:schemeClr val="accent1"/>
+          </a:effectRef>
+          <a:fontRef idx="minor">
+            <a:schemeClr val="tx1"/>
+          </a:fontRef>
+        </p:style>
+      </p:cxnSp>
     </p:spTree>
   </p:cSld>
   <p:clrMapOvr>

</xml_diff>